<commit_message>
Agrego net classes, proyecto y cambio de presentación
</commit_message>
<xml_diff>
--- a/Presentaciones/Presentación del Proyecto.pptx
+++ b/Presentaciones/Presentación del Proyecto.pptx
@@ -4153,36 +4153,6 @@
           </a:p>
         </p:txBody>
       </p:sp>
-      <p:pic>
-        <p:nvPicPr>
-          <p:cNvPr id="5" name="Imagen 4">
-            <a:extLst>
-              <a:ext uri="{FF2B5EF4-FFF2-40B4-BE49-F238E27FC236}">
-                <a16:creationId xmlns:a16="http://schemas.microsoft.com/office/drawing/2014/main" id="{C6C5007F-8367-CC82-52F6-78E53C3225AA}"/>
-              </a:ext>
-            </a:extLst>
-          </p:cNvPr>
-          <p:cNvPicPr>
-            <a:picLocks noChangeAspect="1"/>
-          </p:cNvPicPr>
-          <p:nvPr/>
-        </p:nvPicPr>
-        <p:blipFill>
-          <a:blip r:embed="rId2"/>
-          <a:stretch>
-            <a:fillRect/>
-          </a:stretch>
-        </p:blipFill>
-        <p:spPr>
-          <a:xfrm>
-            <a:off x="1835690" y="700377"/>
-            <a:ext cx="8746585" cy="6014232"/>
-          </a:xfrm>
-          <a:prstGeom prst="rect">
-            <a:avLst/>
-          </a:prstGeom>
-        </p:spPr>
-      </p:pic>
       <p:sp>
         <p:nvSpPr>
           <p:cNvPr id="6" name="CuadroTexto 5">
@@ -4218,6 +4188,36 @@
           </a:p>
         </p:txBody>
       </p:sp>
+      <p:pic>
+        <p:nvPicPr>
+          <p:cNvPr id="4" name="Imagen 3">
+            <a:extLst>
+              <a:ext uri="{FF2B5EF4-FFF2-40B4-BE49-F238E27FC236}">
+                <a16:creationId xmlns:a16="http://schemas.microsoft.com/office/drawing/2014/main" id="{51C93DE1-8D77-A86D-A412-B40EDE9F0158}"/>
+              </a:ext>
+            </a:extLst>
+          </p:cNvPr>
+          <p:cNvPicPr>
+            <a:picLocks noChangeAspect="1"/>
+          </p:cNvPicPr>
+          <p:nvPr/>
+        </p:nvPicPr>
+        <p:blipFill>
+          <a:blip r:embed="rId2"/>
+          <a:stretch>
+            <a:fillRect/>
+          </a:stretch>
+        </p:blipFill>
+        <p:spPr>
+          <a:xfrm>
+            <a:off x="1639744" y="601532"/>
+            <a:ext cx="8695768" cy="5994094"/>
+          </a:xfrm>
+          <a:prstGeom prst="rect">
+            <a:avLst/>
+          </a:prstGeom>
+        </p:spPr>
+      </p:pic>
     </p:spTree>
     <p:extLst>
       <p:ext uri="{BB962C8B-B14F-4D97-AF65-F5344CB8AC3E}">

</xml_diff>